<commit_message>
update phase 4 ppt for class 31/5/2025
</commit_message>
<xml_diff>
--- a/Material de Apoio/07 - Fase 4.pptx
+++ b/Material de Apoio/07 - Fase 4.pptx
@@ -17,7 +17,9 @@
     <p:sldId id="297" r:id="rId11"/>
     <p:sldId id="298" r:id="rId12"/>
     <p:sldId id="299" r:id="rId13"/>
-    <p:sldId id="268" r:id="rId14"/>
+    <p:sldId id="301" r:id="rId14"/>
+    <p:sldId id="302" r:id="rId15"/>
+    <p:sldId id="268" r:id="rId16"/>
   </p:sldIdLst>
   <p:sldSz cx="12192000" cy="6858000"/>
   <p:notesSz cx="6858000" cy="9144000"/>
@@ -122,6 +124,14 @@
     </p:ext>
   </p:extLst>
 </p:presentation>
+</file>
+
+<file path=ppt/revisionInfo.xml><?xml version="1.0" encoding="utf-8"?>
+<p1510:revInfo xmlns:a="http://schemas.openxmlformats.org/drawingml/2006/main" xmlns:r="http://schemas.openxmlformats.org/officeDocument/2006/relationships" xmlns:p1510="http://schemas.microsoft.com/office/powerpoint/2015/10/main">
+  <p1510:revLst>
+    <p1510:client id="{623F5428-3E13-3575-79D7-2C086D4A1901}" v="893" dt="2025-05-31T12:19:47.651"/>
+  </p1510:revLst>
+</p1510:revInfo>
 </file>
 
 <file path=ppt/diagrams/colors1.xml><?xml version="1.0" encoding="utf-8"?>
@@ -4074,12 +4084,76 @@
         <a:bodyPr/>
         <a:lstStyle/>
         <a:p>
-          <a:pPr algn="l"/>
+          <a:pPr algn="l" rtl="0"/>
           <a:r>
             <a:rPr lang="pt-PT" sz="2400" dirty="0"/>
-            <a:t>O token recebido deve ficar guardado em memória, até que o browser/tab seja fechado ou seja feito um logout</a:t>
+            <a:t>O token recebido </a:t>
           </a:r>
-          <a:endParaRPr lang="en-US" sz="2400" dirty="0"/>
+          <a:r>
+            <a:rPr lang="pt-PT" sz="2400" dirty="0">
+              <a:latin typeface="Grandview Display"/>
+            </a:rPr>
+            <a:t>pode ficar</a:t>
+          </a:r>
+          <a:r>
+            <a:rPr lang="pt-PT" sz="2400" dirty="0"/>
+            <a:t> guardado em memória, até que o browser/tab seja fechado ou seja feito um </a:t>
+          </a:r>
+          <a:r>
+            <a:rPr lang="pt-PT" sz="2400" dirty="0" err="1"/>
+            <a:t>logout</a:t>
+          </a:r>
+          <a:r>
+            <a:rPr lang="pt-PT" sz="2400" dirty="0">
+              <a:latin typeface="Grandview Display"/>
+            </a:rPr>
+            <a:t> (limpar o </a:t>
+          </a:r>
+          <a:r>
+            <a:rPr lang="pt-PT" sz="2400" dirty="0" err="1">
+              <a:latin typeface="Grandview Display"/>
+            </a:rPr>
+            <a:t>token</a:t>
+          </a:r>
+          <a:r>
+            <a:rPr lang="pt-PT" dirty="0">
+              <a:latin typeface="Grandview Display"/>
+            </a:rPr>
+            <a:t>). Alternativamente, o </a:t>
+          </a:r>
+          <a:r>
+            <a:rPr lang="pt-PT" dirty="0" err="1">
+              <a:latin typeface="Grandview Display"/>
+            </a:rPr>
+            <a:t>token</a:t>
+          </a:r>
+          <a:r>
+            <a:rPr lang="pt-PT" dirty="0">
+              <a:latin typeface="Grandview Display"/>
+            </a:rPr>
+            <a:t> pode ser guardado no </a:t>
+          </a:r>
+          <a:r>
+            <a:rPr lang="pt-PT" dirty="0" err="1">
+              <a:latin typeface="Grandview Display"/>
+            </a:rPr>
+            <a:t>session</a:t>
+          </a:r>
+          <a:r>
+            <a:rPr lang="pt-PT" dirty="0">
+              <a:latin typeface="Grandview Display"/>
+            </a:rPr>
+            <a:t> storage, para não se perder, em caso de</a:t>
+          </a:r>
+          <a:r>
+            <a:rPr lang="pt-PT" sz="2400" dirty="0">
+              <a:latin typeface="Grandview Display"/>
+            </a:rPr>
+            <a:t> refresh.</a:t>
+          </a:r>
+          <a:endParaRPr lang="en-US" sz="2400" dirty="0">
+            <a:latin typeface="Grandview Display"/>
+          </a:endParaRPr>
         </a:p>
       </dgm:t>
     </dgm:pt>
@@ -4105,43 +4179,58 @@
         </a:p>
       </dgm:t>
     </dgm:pt>
-    <dgm:pt modelId="{C7FF8EB5-161D-4CBE-94CB-A7E5162B1DAD}">
-      <dgm:prSet custT="1"/>
+    <dgm:pt modelId="{49D8B59D-32DA-4A84-B53B-60AF224D9717}">
+      <dgm:prSet phldr="0"/>
       <dgm:spPr/>
       <dgm:t>
         <a:bodyPr/>
         <a:lstStyle/>
         <a:p>
-          <a:pPr algn="l"/>
+          <a:r>
+            <a:rPr lang="pt-PT" sz="2400" dirty="0">
+              <a:latin typeface="Grandview Display"/>
+            </a:rPr>
+            <a:t>O</a:t>
+          </a:r>
           <a:r>
             <a:rPr lang="pt-PT" sz="2400" dirty="0"/>
-            <a:t>O token pode ser o hash da password, para que esta não fique em claro</a:t>
+            <a:t> token pode ser o hash da password, para que esta não fique em claro</a:t>
           </a:r>
-          <a:endParaRPr lang="en-US" sz="2400" dirty="0"/>
+          <a:endParaRPr lang="pt-PT" dirty="0"/>
         </a:p>
       </dgm:t>
     </dgm:pt>
-    <dgm:pt modelId="{80662C23-0AF3-4F48-AEE6-3114056CF4F3}" type="parTrans" cxnId="{83AA57C1-4916-4772-8DAC-ED789FC97BC7}">
+    <dgm:pt modelId="{791D63EC-571D-4F8F-A9E8-C31B45644E28}" type="parTrans" cxnId="{17603E48-EB3C-49C5-8E8C-D8234858817B}">
       <dgm:prSet/>
+      <dgm:spPr/>
+    </dgm:pt>
+    <dgm:pt modelId="{FC721068-926B-4A10-A9AB-3245C6BF83ED}" type="sibTrans" cxnId="{17603E48-EB3C-49C5-8E8C-D8234858817B}">
+      <dgm:prSet/>
+      <dgm:spPr/>
+    </dgm:pt>
+    <dgm:pt modelId="{0DCF843A-5B8D-4438-967C-93B3417BA108}">
+      <dgm:prSet phldr="0"/>
       <dgm:spPr/>
       <dgm:t>
         <a:bodyPr/>
         <a:lstStyle/>
         <a:p>
-          <a:endParaRPr lang="en-US"/>
+          <a:r>
+            <a:rPr lang="pt-PT" b="1" dirty="0">
+              <a:latin typeface="Grandview Display"/>
+            </a:rPr>
+            <a:t>Sugestões:</a:t>
+          </a:r>
         </a:p>
       </dgm:t>
     </dgm:pt>
-    <dgm:pt modelId="{65740C48-0A67-4EFB-8857-F88B511428B9}" type="sibTrans" cxnId="{83AA57C1-4916-4772-8DAC-ED789FC97BC7}">
+    <dgm:pt modelId="{28BC4827-AAD3-4F73-B830-E22C03C15C05}" type="parTrans" cxnId="{A14A1DD5-8C1C-4ED1-8DC2-0C7ADA8E3ECF}">
       <dgm:prSet/>
       <dgm:spPr/>
-      <dgm:t>
-        <a:bodyPr/>
-        <a:lstStyle/>
-        <a:p>
-          <a:endParaRPr lang="en-US"/>
-        </a:p>
-      </dgm:t>
+    </dgm:pt>
+    <dgm:pt modelId="{A1F10322-0C72-4903-972F-C0D5FC4299A2}" type="sibTrans" cxnId="{A14A1DD5-8C1C-4ED1-8DC2-0C7ADA8E3ECF}">
+      <dgm:prSet/>
+      <dgm:spPr/>
     </dgm:pt>
     <dgm:pt modelId="{0EA0E371-CBB2-434A-A2E4-60A0FFC44DFF}" type="pres">
       <dgm:prSet presAssocID="{89E0F444-4096-482F-A5CB-848E300B1AD2}" presName="linear" presStyleCnt="0">
@@ -4217,28 +4306,30 @@
     </dgm:pt>
   </dgm:ptLst>
   <dgm:cxnLst>
-    <dgm:cxn modelId="{A11E4A03-5AD7-44AE-8C05-69696312E4CC}" type="presOf" srcId="{D4F5A3DD-2C45-4C24-961F-4EFE1ED5D580}" destId="{9DF227BF-23C0-4470-B68A-3552ABA89F07}" srcOrd="0" destOrd="0" presId="urn:microsoft.com/office/officeart/2005/8/layout/list1"/>
-    <dgm:cxn modelId="{5CC2FC09-F1E3-4EEE-8E37-0C46198A7177}" type="presOf" srcId="{A86F5801-158B-468D-876D-D0E8B78921C9}" destId="{3696E0AE-3388-4BED-BDBE-7698BEBC8501}" srcOrd="1" destOrd="0" presId="urn:microsoft.com/office/officeart/2005/8/layout/list1"/>
     <dgm:cxn modelId="{066E3F0E-D6FA-462B-A82D-A6E0668EBABF}" srcId="{89E0F444-4096-482F-A5CB-848E300B1AD2}" destId="{D4F5A3DD-2C45-4C24-961F-4EFE1ED5D580}" srcOrd="1" destOrd="0" parTransId="{18228035-6BDC-4FB3-BCA6-7F9DD583A0D6}" sibTransId="{F4D0D3F2-5199-466B-AF74-D4381F61609D}"/>
     <dgm:cxn modelId="{A5867625-355D-40A4-8F6E-FCE6CE97BA28}" type="presOf" srcId="{89E0F444-4096-482F-A5CB-848E300B1AD2}" destId="{0EA0E371-CBB2-434A-A2E4-60A0FFC44DFF}" srcOrd="0" destOrd="0" presId="urn:microsoft.com/office/officeart/2005/8/layout/list1"/>
-    <dgm:cxn modelId="{61FEF138-963F-4437-AAA5-8F78C9C4658F}" srcId="{D4F5A3DD-2C45-4C24-961F-4EFE1ED5D580}" destId="{6024448C-13E3-48BE-904F-999E9C9C04C3}" srcOrd="0" destOrd="0" parTransId="{F4027F60-A6DA-4717-B46D-A74CF83B38CA}" sibTransId="{3672C724-C6BC-4CD9-AA94-F0EF552139DB}"/>
-    <dgm:cxn modelId="{DA0E8C72-B15C-4DCF-9D34-9558CC62CEDC}" type="presOf" srcId="{6024448C-13E3-48BE-904F-999E9C9C04C3}" destId="{F1183D25-0EDC-4437-88C4-6E1708937DAB}" srcOrd="0" destOrd="0" presId="urn:microsoft.com/office/officeart/2005/8/layout/list1"/>
-    <dgm:cxn modelId="{327627B1-6052-4381-8CF2-21664F7AAE4B}" type="presOf" srcId="{A86F5801-158B-468D-876D-D0E8B78921C9}" destId="{CB43B7E4-2F67-4340-83A2-06E2FE8C0EB7}" srcOrd="0" destOrd="0" presId="urn:microsoft.com/office/officeart/2005/8/layout/list1"/>
+    <dgm:cxn modelId="{F013CD2C-ABB2-4EDB-B71B-16B6674664F6}" type="presOf" srcId="{A86F5801-158B-468D-876D-D0E8B78921C9}" destId="{3696E0AE-3388-4BED-BDBE-7698BEBC8501}" srcOrd="1" destOrd="0" presId="urn:microsoft.com/office/officeart/2005/8/layout/list1"/>
+    <dgm:cxn modelId="{61FEF138-963F-4437-AAA5-8F78C9C4658F}" srcId="{0DCF843A-5B8D-4438-967C-93B3417BA108}" destId="{6024448C-13E3-48BE-904F-999E9C9C04C3}" srcOrd="0" destOrd="0" parTransId="{F4027F60-A6DA-4717-B46D-A74CF83B38CA}" sibTransId="{3672C724-C6BC-4CD9-AA94-F0EF552139DB}"/>
+    <dgm:cxn modelId="{17603E48-EB3C-49C5-8E8C-D8234858817B}" srcId="{0DCF843A-5B8D-4438-967C-93B3417BA108}" destId="{49D8B59D-32DA-4A84-B53B-60AF224D9717}" srcOrd="1" destOrd="0" parTransId="{791D63EC-571D-4F8F-A9E8-C31B45644E28}" sibTransId="{FC721068-926B-4A10-A9AB-3245C6BF83ED}"/>
+    <dgm:cxn modelId="{C9B0CA82-1595-45DD-BFAC-E90DE3578A16}" type="presOf" srcId="{D4F5A3DD-2C45-4C24-961F-4EFE1ED5D580}" destId="{9DF227BF-23C0-4470-B68A-3552ABA89F07}" srcOrd="0" destOrd="0" presId="urn:microsoft.com/office/officeart/2005/8/layout/list1"/>
+    <dgm:cxn modelId="{1D47AD8B-E033-4BC3-AB2F-62DA5A07806D}" type="presOf" srcId="{49D8B59D-32DA-4A84-B53B-60AF224D9717}" destId="{F1183D25-0EDC-4437-88C4-6E1708937DAB}" srcOrd="0" destOrd="2" presId="urn:microsoft.com/office/officeart/2005/8/layout/list1"/>
+    <dgm:cxn modelId="{0214DBB0-EA5E-48B1-B5A3-1984839219A7}" type="presOf" srcId="{0DCF843A-5B8D-4438-967C-93B3417BA108}" destId="{F1183D25-0EDC-4437-88C4-6E1708937DAB}" srcOrd="0" destOrd="0" presId="urn:microsoft.com/office/officeart/2005/8/layout/list1"/>
     <dgm:cxn modelId="{403999BE-4667-4B64-994E-7DE8FB5BE5B2}" srcId="{89E0F444-4096-482F-A5CB-848E300B1AD2}" destId="{A86F5801-158B-468D-876D-D0E8B78921C9}" srcOrd="0" destOrd="0" parTransId="{0F1F7E59-24D7-40F3-9361-1DD88CE09698}" sibTransId="{AE2BEC37-D894-48B6-9F87-017611157D7B}"/>
-    <dgm:cxn modelId="{83AA57C1-4916-4772-8DAC-ED789FC97BC7}" srcId="{D4F5A3DD-2C45-4C24-961F-4EFE1ED5D580}" destId="{C7FF8EB5-161D-4CBE-94CB-A7E5162B1DAD}" srcOrd="1" destOrd="0" parTransId="{80662C23-0AF3-4F48-AEE6-3114056CF4F3}" sibTransId="{65740C48-0A67-4EFB-8857-F88B511428B9}"/>
-    <dgm:cxn modelId="{57D21FD5-87B9-42BD-9F9D-78E8CB0417E2}" type="presOf" srcId="{C7FF8EB5-161D-4CBE-94CB-A7E5162B1DAD}" destId="{F1183D25-0EDC-4437-88C4-6E1708937DAB}" srcOrd="0" destOrd="1" presId="urn:microsoft.com/office/officeart/2005/8/layout/list1"/>
-    <dgm:cxn modelId="{215440ED-A64D-4CD4-94C4-0D25F363B3E9}" type="presOf" srcId="{D4F5A3DD-2C45-4C24-961F-4EFE1ED5D580}" destId="{AB40ED03-F82F-405E-B301-91D51A794ED5}" srcOrd="1" destOrd="0" presId="urn:microsoft.com/office/officeart/2005/8/layout/list1"/>
-    <dgm:cxn modelId="{3F27D6DD-1D31-40A8-B694-C2FBFDC9F457}" type="presParOf" srcId="{0EA0E371-CBB2-434A-A2E4-60A0FFC44DFF}" destId="{EE8DC717-2EAB-44D0-BC82-4694B6619055}" srcOrd="0" destOrd="0" presId="urn:microsoft.com/office/officeart/2005/8/layout/list1"/>
-    <dgm:cxn modelId="{49792B55-42E2-4FCE-BAAC-D06BB10720CE}" type="presParOf" srcId="{EE8DC717-2EAB-44D0-BC82-4694B6619055}" destId="{CB43B7E4-2F67-4340-83A2-06E2FE8C0EB7}" srcOrd="0" destOrd="0" presId="urn:microsoft.com/office/officeart/2005/8/layout/list1"/>
-    <dgm:cxn modelId="{E2E29244-3B50-4627-BCBB-C8B010B69CCE}" type="presParOf" srcId="{EE8DC717-2EAB-44D0-BC82-4694B6619055}" destId="{3696E0AE-3388-4BED-BDBE-7698BEBC8501}" srcOrd="1" destOrd="0" presId="urn:microsoft.com/office/officeart/2005/8/layout/list1"/>
-    <dgm:cxn modelId="{B3F76276-79C1-4DA1-9E61-9720A50AA666}" type="presParOf" srcId="{0EA0E371-CBB2-434A-A2E4-60A0FFC44DFF}" destId="{8627648E-6E91-4C31-A716-DA51A6E26DBA}" srcOrd="1" destOrd="0" presId="urn:microsoft.com/office/officeart/2005/8/layout/list1"/>
-    <dgm:cxn modelId="{9BC07943-8A09-4FB0-A1A5-15FB5A3812C1}" type="presParOf" srcId="{0EA0E371-CBB2-434A-A2E4-60A0FFC44DFF}" destId="{FA783A33-3E7A-4009-9AA2-AC2EC7147DD4}" srcOrd="2" destOrd="0" presId="urn:microsoft.com/office/officeart/2005/8/layout/list1"/>
-    <dgm:cxn modelId="{F22EF657-A3D2-4635-9466-DC3979D39B9D}" type="presParOf" srcId="{0EA0E371-CBB2-434A-A2E4-60A0FFC44DFF}" destId="{01815B96-DD53-4894-B4DB-2666646C4876}" srcOrd="3" destOrd="0" presId="urn:microsoft.com/office/officeart/2005/8/layout/list1"/>
-    <dgm:cxn modelId="{F65FFCA6-AF89-4BA5-9393-72A5E3184CE3}" type="presParOf" srcId="{0EA0E371-CBB2-434A-A2E4-60A0FFC44DFF}" destId="{54069224-F0BC-4E58-A65D-382F2966D6F0}" srcOrd="4" destOrd="0" presId="urn:microsoft.com/office/officeart/2005/8/layout/list1"/>
-    <dgm:cxn modelId="{F673FBAE-7791-45A0-A309-E71C4FB40F59}" type="presParOf" srcId="{54069224-F0BC-4E58-A65D-382F2966D6F0}" destId="{9DF227BF-23C0-4470-B68A-3552ABA89F07}" srcOrd="0" destOrd="0" presId="urn:microsoft.com/office/officeart/2005/8/layout/list1"/>
-    <dgm:cxn modelId="{A7B83A1C-6321-4711-832D-D666D0AD47F5}" type="presParOf" srcId="{54069224-F0BC-4E58-A65D-382F2966D6F0}" destId="{AB40ED03-F82F-405E-B301-91D51A794ED5}" srcOrd="1" destOrd="0" presId="urn:microsoft.com/office/officeart/2005/8/layout/list1"/>
-    <dgm:cxn modelId="{26C3EFE1-67DC-44EB-BB73-1BD93A53AF63}" type="presParOf" srcId="{0EA0E371-CBB2-434A-A2E4-60A0FFC44DFF}" destId="{65A4272D-D18B-4E4B-B8FC-91346E275CA5}" srcOrd="5" destOrd="0" presId="urn:microsoft.com/office/officeart/2005/8/layout/list1"/>
-    <dgm:cxn modelId="{8E017514-3A3C-4346-B12A-26AD6FBF2FF7}" type="presParOf" srcId="{0EA0E371-CBB2-434A-A2E4-60A0FFC44DFF}" destId="{F1183D25-0EDC-4437-88C4-6E1708937DAB}" srcOrd="6" destOrd="0" presId="urn:microsoft.com/office/officeart/2005/8/layout/list1"/>
+    <dgm:cxn modelId="{030A2CD0-3A1D-4806-B2B9-E882E3A6B0C6}" type="presOf" srcId="{6024448C-13E3-48BE-904F-999E9C9C04C3}" destId="{F1183D25-0EDC-4437-88C4-6E1708937DAB}" srcOrd="0" destOrd="1" presId="urn:microsoft.com/office/officeart/2005/8/layout/list1"/>
+    <dgm:cxn modelId="{A14A1DD5-8C1C-4ED1-8DC2-0C7ADA8E3ECF}" srcId="{D4F5A3DD-2C45-4C24-961F-4EFE1ED5D580}" destId="{0DCF843A-5B8D-4438-967C-93B3417BA108}" srcOrd="0" destOrd="0" parTransId="{28BC4827-AAD3-4F73-B830-E22C03C15C05}" sibTransId="{A1F10322-0C72-4903-972F-C0D5FC4299A2}"/>
+    <dgm:cxn modelId="{9249DCDD-3F09-457D-9025-63952FB98C47}" type="presOf" srcId="{D4F5A3DD-2C45-4C24-961F-4EFE1ED5D580}" destId="{AB40ED03-F82F-405E-B301-91D51A794ED5}" srcOrd="1" destOrd="0" presId="urn:microsoft.com/office/officeart/2005/8/layout/list1"/>
+    <dgm:cxn modelId="{F277E0E1-17A2-4800-A6F2-9E093323ED28}" type="presOf" srcId="{A86F5801-158B-468D-876D-D0E8B78921C9}" destId="{CB43B7E4-2F67-4340-83A2-06E2FE8C0EB7}" srcOrd="0" destOrd="0" presId="urn:microsoft.com/office/officeart/2005/8/layout/list1"/>
+    <dgm:cxn modelId="{B0908CB4-F7B6-4882-8195-B4E9B388051D}" type="presParOf" srcId="{0EA0E371-CBB2-434A-A2E4-60A0FFC44DFF}" destId="{EE8DC717-2EAB-44D0-BC82-4694B6619055}" srcOrd="0" destOrd="0" presId="urn:microsoft.com/office/officeart/2005/8/layout/list1"/>
+    <dgm:cxn modelId="{DDD9426A-2046-4388-9669-0D7943298ACF}" type="presParOf" srcId="{EE8DC717-2EAB-44D0-BC82-4694B6619055}" destId="{CB43B7E4-2F67-4340-83A2-06E2FE8C0EB7}" srcOrd="0" destOrd="0" presId="urn:microsoft.com/office/officeart/2005/8/layout/list1"/>
+    <dgm:cxn modelId="{9E55D21E-8E71-47BC-B6A8-2869FE7B1CA1}" type="presParOf" srcId="{EE8DC717-2EAB-44D0-BC82-4694B6619055}" destId="{3696E0AE-3388-4BED-BDBE-7698BEBC8501}" srcOrd="1" destOrd="0" presId="urn:microsoft.com/office/officeart/2005/8/layout/list1"/>
+    <dgm:cxn modelId="{9BD7AA26-4DD5-4326-A769-B28635B5DBA7}" type="presParOf" srcId="{0EA0E371-CBB2-434A-A2E4-60A0FFC44DFF}" destId="{8627648E-6E91-4C31-A716-DA51A6E26DBA}" srcOrd="1" destOrd="0" presId="urn:microsoft.com/office/officeart/2005/8/layout/list1"/>
+    <dgm:cxn modelId="{5094ECD2-D876-4C37-8CB2-67181CA9A903}" type="presParOf" srcId="{0EA0E371-CBB2-434A-A2E4-60A0FFC44DFF}" destId="{FA783A33-3E7A-4009-9AA2-AC2EC7147DD4}" srcOrd="2" destOrd="0" presId="urn:microsoft.com/office/officeart/2005/8/layout/list1"/>
+    <dgm:cxn modelId="{35D5425D-CDF1-4DB4-A0EF-95CDE5D4ECF3}" type="presParOf" srcId="{0EA0E371-CBB2-434A-A2E4-60A0FFC44DFF}" destId="{01815B96-DD53-4894-B4DB-2666646C4876}" srcOrd="3" destOrd="0" presId="urn:microsoft.com/office/officeart/2005/8/layout/list1"/>
+    <dgm:cxn modelId="{ECC120F0-6EE8-4527-B59F-792F402ADBB6}" type="presParOf" srcId="{0EA0E371-CBB2-434A-A2E4-60A0FFC44DFF}" destId="{54069224-F0BC-4E58-A65D-382F2966D6F0}" srcOrd="4" destOrd="0" presId="urn:microsoft.com/office/officeart/2005/8/layout/list1"/>
+    <dgm:cxn modelId="{2A5311F0-0D46-49CA-848F-7C9AD42BB0AB}" type="presParOf" srcId="{54069224-F0BC-4E58-A65D-382F2966D6F0}" destId="{9DF227BF-23C0-4470-B68A-3552ABA89F07}" srcOrd="0" destOrd="0" presId="urn:microsoft.com/office/officeart/2005/8/layout/list1"/>
+    <dgm:cxn modelId="{A3160887-69B4-4A86-AD5E-A8D2F55F7CE6}" type="presParOf" srcId="{54069224-F0BC-4E58-A65D-382F2966D6F0}" destId="{AB40ED03-F82F-405E-B301-91D51A794ED5}" srcOrd="1" destOrd="0" presId="urn:microsoft.com/office/officeart/2005/8/layout/list1"/>
+    <dgm:cxn modelId="{DD18D366-51E2-466D-86BC-471970065A2C}" type="presParOf" srcId="{0EA0E371-CBB2-434A-A2E4-60A0FFC44DFF}" destId="{65A4272D-D18B-4E4B-B8FC-91346E275CA5}" srcOrd="5" destOrd="0" presId="urn:microsoft.com/office/officeart/2005/8/layout/list1"/>
+    <dgm:cxn modelId="{6EA98F52-C0D7-4403-8BCF-747B825E2AA3}" type="presParOf" srcId="{0EA0E371-CBB2-434A-A2E4-60A0FFC44DFF}" destId="{F1183D25-0EDC-4437-88C4-6E1708937DAB}" srcOrd="6" destOrd="0" presId="urn:microsoft.com/office/officeart/2005/8/layout/list1"/>
   </dgm:cxnLst>
   <dgm:bg/>
   <dgm:whole/>
@@ -5306,8 +5397,8 @@
       </dsp:nvSpPr>
       <dsp:spPr>
         <a:xfrm>
-          <a:off x="0" y="376062"/>
-          <a:ext cx="10891837" cy="604800"/>
+          <a:off x="0" y="315337"/>
+          <a:ext cx="10891837" cy="529200"/>
         </a:xfrm>
         <a:prstGeom prst="rect">
           <a:avLst/>
@@ -5355,8 +5446,8 @@
       </dsp:nvSpPr>
       <dsp:spPr>
         <a:xfrm>
-          <a:off x="544591" y="21822"/>
-          <a:ext cx="7624285" cy="708480"/>
+          <a:off x="544591" y="5377"/>
+          <a:ext cx="7624285" cy="619920"/>
         </a:xfrm>
         <a:prstGeom prst="roundRect">
           <a:avLst/>
@@ -5423,8 +5514,8 @@
         </a:p>
       </dsp:txBody>
       <dsp:txXfrm>
-        <a:off x="579176" y="56407"/>
-        <a:ext cx="7555115" cy="639310"/>
+        <a:off x="574853" y="35639"/>
+        <a:ext cx="7563761" cy="559396"/>
       </dsp:txXfrm>
     </dsp:sp>
     <dsp:sp modelId="{F1183D25-0EDC-4437-88C4-6E1708937DAB}">
@@ -5434,8 +5525,8 @@
       </dsp:nvSpPr>
       <dsp:spPr>
         <a:xfrm>
-          <a:off x="0" y="1464702"/>
-          <a:ext cx="10891837" cy="2079000"/>
+          <a:off x="0" y="1267898"/>
+          <a:ext cx="10891837" cy="3175200"/>
         </a:xfrm>
         <a:prstGeom prst="rect">
           <a:avLst/>
@@ -5476,12 +5567,32 @@
         <a:fontRef idx="minor"/>
       </dsp:style>
       <dsp:txBody>
-        <a:bodyPr spcFirstLastPara="0" vert="horz" wrap="square" lIns="845328" tIns="499872" rIns="845328" bIns="170688" numCol="1" spcCol="1270" anchor="t" anchorCtr="0">
+        <a:bodyPr spcFirstLastPara="0" vert="horz" wrap="square" lIns="845328" tIns="437388" rIns="845328" bIns="170688" numCol="1" spcCol="1270" anchor="t" anchorCtr="0">
           <a:noAutofit/>
         </a:bodyPr>
         <a:lstStyle/>
         <a:p>
-          <a:pPr marL="228600" lvl="1" indent="-228600" algn="l" defTabSz="1066800">
+          <a:pPr marL="285750" lvl="1" indent="-285750" algn="l" defTabSz="1600200">
+            <a:lnSpc>
+              <a:spcPct val="90000"/>
+            </a:lnSpc>
+            <a:spcBef>
+              <a:spcPct val="0"/>
+            </a:spcBef>
+            <a:spcAft>
+              <a:spcPct val="15000"/>
+            </a:spcAft>
+            <a:buChar char="•"/>
+          </a:pPr>
+          <a:r>
+            <a:rPr lang="pt-PT" sz="3600" b="1" kern="1200" dirty="0">
+              <a:latin typeface="Grandview Display"/>
+            </a:rPr>
+            <a:t>Sugestões:</a:t>
+          </a:r>
+        </a:p>
+        <a:p>
+          <a:pPr marL="457200" lvl="2" indent="-228600" algn="l" defTabSz="1066800" rtl="0">
             <a:lnSpc>
               <a:spcPct val="90000"/>
             </a:lnSpc>
@@ -5495,12 +5606,76 @@
           </a:pPr>
           <a:r>
             <a:rPr lang="pt-PT" sz="2400" kern="1200" dirty="0"/>
-            <a:t>O token recebido deve ficar guardado em memória, até que o browser/tab seja fechado ou seja feito um logout</a:t>
+            <a:t>O token recebido </a:t>
           </a:r>
-          <a:endParaRPr lang="en-US" sz="2400" kern="1200" dirty="0"/>
+          <a:r>
+            <a:rPr lang="pt-PT" sz="2400" kern="1200" dirty="0">
+              <a:latin typeface="Grandview Display"/>
+            </a:rPr>
+            <a:t>pode ficar</a:t>
+          </a:r>
+          <a:r>
+            <a:rPr lang="pt-PT" sz="2400" kern="1200" dirty="0"/>
+            <a:t> guardado em memória, até que o browser/tab seja fechado ou seja feito um </a:t>
+          </a:r>
+          <a:r>
+            <a:rPr lang="pt-PT" sz="2400" kern="1200" dirty="0" err="1"/>
+            <a:t>logout</a:t>
+          </a:r>
+          <a:r>
+            <a:rPr lang="pt-PT" sz="2400" kern="1200" dirty="0">
+              <a:latin typeface="Grandview Display"/>
+            </a:rPr>
+            <a:t> (limpar o </a:t>
+          </a:r>
+          <a:r>
+            <a:rPr lang="pt-PT" sz="2400" kern="1200" dirty="0" err="1">
+              <a:latin typeface="Grandview Display"/>
+            </a:rPr>
+            <a:t>token</a:t>
+          </a:r>
+          <a:r>
+            <a:rPr lang="pt-PT" kern="1200" dirty="0">
+              <a:latin typeface="Grandview Display"/>
+            </a:rPr>
+            <a:t>). Alternativamente, o </a:t>
+          </a:r>
+          <a:r>
+            <a:rPr lang="pt-PT" kern="1200" dirty="0" err="1">
+              <a:latin typeface="Grandview Display"/>
+            </a:rPr>
+            <a:t>token</a:t>
+          </a:r>
+          <a:r>
+            <a:rPr lang="pt-PT" kern="1200" dirty="0">
+              <a:latin typeface="Grandview Display"/>
+            </a:rPr>
+            <a:t> pode ser guardado no </a:t>
+          </a:r>
+          <a:r>
+            <a:rPr lang="pt-PT" kern="1200" dirty="0" err="1">
+              <a:latin typeface="Grandview Display"/>
+            </a:rPr>
+            <a:t>session</a:t>
+          </a:r>
+          <a:r>
+            <a:rPr lang="pt-PT" kern="1200" dirty="0">
+              <a:latin typeface="Grandview Display"/>
+            </a:rPr>
+            <a:t> storage, para não se perder, em caso de</a:t>
+          </a:r>
+          <a:r>
+            <a:rPr lang="pt-PT" sz="2400" kern="1200" dirty="0">
+              <a:latin typeface="Grandview Display"/>
+            </a:rPr>
+            <a:t> refresh.</a:t>
+          </a:r>
+          <a:endParaRPr lang="en-US" sz="2400" kern="1200" dirty="0">
+            <a:latin typeface="Grandview Display"/>
+          </a:endParaRPr>
         </a:p>
         <a:p>
-          <a:pPr marL="228600" lvl="1" indent="-228600" algn="l" defTabSz="1066800">
+          <a:pPr marL="457200" lvl="2" indent="-228600" algn="l" defTabSz="1066800">
             <a:lnSpc>
               <a:spcPct val="90000"/>
             </a:lnSpc>
@@ -5513,15 +5688,21 @@
             <a:buChar char="•"/>
           </a:pPr>
           <a:r>
+            <a:rPr lang="pt-PT" sz="2400" kern="1200" dirty="0">
+              <a:latin typeface="Grandview Display"/>
+            </a:rPr>
+            <a:t>O</a:t>
+          </a:r>
+          <a:r>
             <a:rPr lang="pt-PT" sz="2400" kern="1200" dirty="0"/>
-            <a:t>O token pode ser o hash da password, para que esta não fique em claro</a:t>
+            <a:t> token pode ser o hash da password, para que esta não fique em claro</a:t>
           </a:r>
-          <a:endParaRPr lang="en-US" sz="2400" kern="1200" dirty="0"/>
+          <a:endParaRPr lang="pt-PT" kern="1200" dirty="0"/>
         </a:p>
       </dsp:txBody>
       <dsp:txXfrm>
-        <a:off x="0" y="1464702"/>
-        <a:ext cx="10891837" cy="2079000"/>
+        <a:off x="0" y="1267898"/>
+        <a:ext cx="10891837" cy="3175200"/>
       </dsp:txXfrm>
     </dsp:sp>
     <dsp:sp modelId="{AB40ED03-F82F-405E-B301-91D51A794ED5}">
@@ -5531,8 +5712,8 @@
       </dsp:nvSpPr>
       <dsp:spPr>
         <a:xfrm>
-          <a:off x="544591" y="1110462"/>
-          <a:ext cx="7624285" cy="708480"/>
+          <a:off x="544591" y="957938"/>
+          <a:ext cx="7624285" cy="619920"/>
         </a:xfrm>
         <a:prstGeom prst="roundRect">
           <a:avLst/>
@@ -5603,8 +5784,8 @@
         </a:p>
       </dsp:txBody>
       <dsp:txXfrm>
-        <a:off x="579176" y="1145047"/>
-        <a:ext cx="7555115" cy="639310"/>
+        <a:off x="574853" y="988200"/>
+        <a:ext cx="7563761" cy="559396"/>
       </dsp:txXfrm>
     </dsp:sp>
   </dsp:spTree>
@@ -11818,7 +11999,7 @@
           <a:p>
             <a:fld id="{6444479B-705B-4489-957E-7E8A228BDFA0}" type="datetime1">
               <a:rPr lang="en-US" smtClean="0"/>
-              <a:t>5/30/2025</a:t>
+              <a:t>5/31/2025</a:t>
             </a:fld>
             <a:endParaRPr lang="en-US"/>
           </a:p>
@@ -12019,7 +12200,7 @@
           <a:p>
             <a:fld id="{C07B66AD-7C08-490A-ADA4-B47E10FB2407}" type="datetime1">
               <a:rPr lang="en-US" smtClean="0"/>
-              <a:t>5/30/2025</a:t>
+              <a:t>5/31/2025</a:t>
             </a:fld>
             <a:endParaRPr lang="en-US"/>
           </a:p>
@@ -12279,7 +12460,7 @@
           <a:p>
             <a:fld id="{05B95027-4255-49E7-9841-CD21BCC99996}" type="datetime1">
               <a:rPr lang="en-US" smtClean="0"/>
-              <a:t>5/30/2025</a:t>
+              <a:t>5/31/2025</a:t>
             </a:fld>
             <a:endParaRPr lang="en-US"/>
           </a:p>
@@ -12521,7 +12702,7 @@
           <a:p>
             <a:fld id="{9F89F774-3FA6-43B8-9241-99959C8FD463}" type="datetime1">
               <a:rPr lang="en-US" smtClean="0"/>
-              <a:t>5/30/2025</a:t>
+              <a:t>5/31/2025</a:t>
             </a:fld>
             <a:endParaRPr lang="en-US"/>
           </a:p>
@@ -12849,7 +13030,7 @@
           <a:p>
             <a:fld id="{F9504452-5DCC-4FE2-A5C9-8A5EF6714D65}" type="datetime1">
               <a:rPr lang="en-US" smtClean="0"/>
-              <a:t>5/30/2025</a:t>
+              <a:t>5/31/2025</a:t>
             </a:fld>
             <a:endParaRPr lang="en-US"/>
           </a:p>
@@ -13160,7 +13341,7 @@
           <a:p>
             <a:fld id="{E579ABC2-0180-4F3A-A895-A85BC724D472}" type="datetime1">
               <a:rPr lang="en-US" smtClean="0"/>
-              <a:t>5/30/2025</a:t>
+              <a:t>5/31/2025</a:t>
             </a:fld>
             <a:endParaRPr lang="en-US"/>
           </a:p>
@@ -13579,7 +13760,7 @@
           <a:p>
             <a:fld id="{6AEEA9BA-4E8F-439E-BEA4-91FBA01E3F5F}" type="datetime1">
               <a:rPr lang="en-US" smtClean="0"/>
-              <a:t>5/30/2025</a:t>
+              <a:t>5/31/2025</a:t>
             </a:fld>
             <a:endParaRPr lang="en-US"/>
           </a:p>
@@ -13722,7 +13903,7 @@
           <a:p>
             <a:fld id="{BE15BF18-0007-481C-AA29-413124BC3EE7}" type="datetime1">
               <a:rPr lang="en-US" smtClean="0"/>
-              <a:t>5/30/2025</a:t>
+              <a:t>5/31/2025</a:t>
             </a:fld>
             <a:endParaRPr lang="en-US"/>
           </a:p>
@@ -13885,7 +14066,7 @@
           <a:p>
             <a:fld id="{09BE9870-3748-43AD-B547-02A075CB4A1D}" type="datetime1">
               <a:rPr lang="en-US" smtClean="0"/>
-              <a:t>5/30/2025</a:t>
+              <a:t>5/31/2025</a:t>
             </a:fld>
             <a:endParaRPr lang="en-US"/>
           </a:p>
@@ -14203,7 +14384,7 @@
           <a:p>
             <a:fld id="{558E7897-33C5-4F1A-9307-D068E37F3DC7}" type="datetime1">
               <a:rPr lang="en-US" smtClean="0"/>
-              <a:t>5/30/2025</a:t>
+              <a:t>5/31/2025</a:t>
             </a:fld>
             <a:endParaRPr lang="en-US"/>
           </a:p>
@@ -14499,7 +14680,7 @@
           <a:p>
             <a:fld id="{82E171BA-CC09-47C8-A6DF-F5C5CB59CEEC}" type="datetime1">
               <a:rPr lang="en-US" smtClean="0"/>
-              <a:t>5/30/2025</a:t>
+              <a:t>5/31/2025</a:t>
             </a:fld>
             <a:endParaRPr lang="en-US"/>
           </a:p>
@@ -14741,7 +14922,7 @@
           <a:p>
             <a:fld id="{7DA38F49-B3E2-4BF0-BEC7-C30D34ABBB8D}" type="datetime1">
               <a:rPr lang="en-US" smtClean="0"/>
-              <a:t>5/30/2025</a:t>
+              <a:t>5/31/2025</a:t>
             </a:fld>
             <a:endParaRPr lang="en-US"/>
           </a:p>
@@ -15908,6 +16089,510 @@
 <file path=ppt/slides/slide13.xml><?xml version="1.0" encoding="utf-8"?>
 <p:sld xmlns:a="http://schemas.openxmlformats.org/drawingml/2006/main" xmlns:r="http://schemas.openxmlformats.org/officeDocument/2006/relationships" xmlns:p="http://schemas.openxmlformats.org/presentationml/2006/main">
   <p:cSld>
+    <p:spTree>
+      <p:nvGrpSpPr>
+        <p:cNvPr id="1" name=""/>
+        <p:cNvGrpSpPr/>
+        <p:nvPr/>
+      </p:nvGrpSpPr>
+      <p:grpSpPr>
+        <a:xfrm>
+          <a:off x="0" y="0"/>
+          <a:ext cx="0" cy="0"/>
+          <a:chOff x="0" y="0"/>
+          <a:chExt cx="0" cy="0"/>
+        </a:xfrm>
+      </p:grpSpPr>
+      <p:sp>
+        <p:nvSpPr>
+          <p:cNvPr id="2" name="Title 1">
+            <a:extLst>
+              <a:ext uri="{FF2B5EF4-FFF2-40B4-BE49-F238E27FC236}">
+                <a16:creationId xmlns:a16="http://schemas.microsoft.com/office/drawing/2014/main" id="{EB8A155B-36C4-F6C4-C277-D031BD94E8E8}"/>
+              </a:ext>
+            </a:extLst>
+          </p:cNvPr>
+          <p:cNvSpPr>
+            <a:spLocks noGrp="1"/>
+          </p:cNvSpPr>
+          <p:nvPr>
+            <p:ph type="title"/>
+          </p:nvPr>
+        </p:nvSpPr>
+        <p:spPr/>
+        <p:txBody>
+          <a:bodyPr>
+            <a:normAutofit fontScale="90000"/>
+          </a:bodyPr>
+          <a:lstStyle/>
+          <a:p>
+            <a:r>
+              <a:rPr lang="pt-PT" dirty="0"/>
+              <a:t>Alterações nos ficheiros do </a:t>
+            </a:r>
+            <a:r>
+              <a:rPr lang="pt-PT"/>
+              <a:t>gitHub para a Fase 4</a:t>
+            </a:r>
+            <a:endParaRPr lang="pt-PT" dirty="0"/>
+          </a:p>
+        </p:txBody>
+      </p:sp>
+      <p:sp>
+        <p:nvSpPr>
+          <p:cNvPr id="3" name="Content Placeholder 2">
+            <a:extLst>
+              <a:ext uri="{FF2B5EF4-FFF2-40B4-BE49-F238E27FC236}">
+                <a16:creationId xmlns:a16="http://schemas.microsoft.com/office/drawing/2014/main" id="{24F10B58-E968-7930-5893-B1C6C861B85B}"/>
+              </a:ext>
+            </a:extLst>
+          </p:cNvPr>
+          <p:cNvSpPr>
+            <a:spLocks noGrp="1"/>
+          </p:cNvSpPr>
+          <p:nvPr>
+            <p:ph idx="1"/>
+          </p:nvPr>
+        </p:nvSpPr>
+        <p:spPr/>
+        <p:txBody>
+          <a:bodyPr vert="horz" lIns="91440" tIns="45720" rIns="91440" bIns="45720" rtlCol="0" anchor="t">
+            <a:normAutofit/>
+          </a:bodyPr>
+          <a:lstStyle/>
+          <a:p>
+            <a:r>
+              <a:rPr lang="pt-PT" dirty="0"/>
+              <a:t>No </a:t>
+            </a:r>
+            <a:r>
+              <a:rPr lang="pt-PT" err="1"/>
+              <a:t>build</a:t>
+            </a:r>
+            <a:r>
+              <a:rPr lang="pt-PT"/>
+              <a:t> do gradle foi alterada a geração do </a:t>
+            </a:r>
+            <a:r>
+              <a:rPr lang="pt-PT" err="1"/>
+              <a:t>jar</a:t>
+            </a:r>
+            <a:r>
+              <a:rPr lang="pt-PT"/>
+              <a:t>, que passou a ter um </a:t>
+            </a:r>
+            <a:r>
+              <a:rPr lang="pt-PT" b="1" err="1"/>
+              <a:t>Manifest</a:t>
+            </a:r>
+            <a:r>
+              <a:rPr lang="pt-PT" b="1" dirty="0"/>
+              <a:t> </a:t>
+            </a:r>
+            <a:r>
+              <a:rPr lang="pt-PT"/>
+              <a:t>com o </a:t>
+            </a:r>
+            <a:r>
+              <a:rPr lang="pt-PT" err="1"/>
+              <a:t>entrypoint</a:t>
+            </a:r>
+            <a:r>
+              <a:rPr lang="pt-PT" dirty="0"/>
+              <a:t> </a:t>
+            </a:r>
+            <a:r>
+              <a:rPr lang="pt-PT"/>
+              <a:t>para a aplicação (ver </a:t>
+            </a:r>
+            <a:r>
+              <a:rPr lang="pt-PT">
+                <a:latin typeface="Consolas"/>
+              </a:rPr>
+              <a:t>build.gradle.kts</a:t>
+            </a:r>
+            <a:r>
+              <a:rPr lang="pt-PT"/>
+              <a:t>)</a:t>
+            </a:r>
+          </a:p>
+          <a:p>
+            <a:r>
+              <a:rPr lang="pt-PT"/>
+              <a:t>Passou a existir um ficheiro </a:t>
+            </a:r>
+            <a:r>
+              <a:rPr lang="pt-PT" b="1"/>
+              <a:t>Dockerfile</a:t>
+            </a:r>
+            <a:r>
+              <a:rPr lang="pt-PT"/>
+              <a:t>, para se gerar a imagem com o container Docker</a:t>
+            </a:r>
+            <a:endParaRPr lang="pt-PT" dirty="0"/>
+          </a:p>
+          <a:p>
+            <a:pPr marL="493395" lvl="1">
+              <a:buFont typeface="Courier New" panose="020B0604020202020204" pitchFamily="34" charset="0"/>
+              <a:buChar char="o"/>
+            </a:pPr>
+            <a:r>
+              <a:rPr lang="pt-PT"/>
+              <a:t>Neste ficheiro, podem adaptar o nome da pasta </a:t>
+            </a:r>
+            <a:r>
+              <a:rPr lang="pt-PT">
+                <a:latin typeface="Consolas"/>
+              </a:rPr>
+              <a:t>static-content</a:t>
+            </a:r>
+            <a:r>
+              <a:rPr lang="pt-PT"/>
+              <a:t>, se estiverem a usar outro nome</a:t>
+            </a:r>
+          </a:p>
+          <a:p>
+            <a:r>
+              <a:rPr lang="pt-PT"/>
+              <a:t>Foi adicionado um exemplo para ter uma rota a ligar-se à DB que está a correr no Render, em vez de se ligar à base de dados local, usando a variável de ambiente</a:t>
+            </a:r>
+            <a:r>
+              <a:rPr lang="pt-PT" sz="3200" dirty="0"/>
+              <a:t> </a:t>
+            </a:r>
+            <a:r>
+              <a:rPr lang="pt-PT" sz="1600" b="1">
+                <a:solidFill>
+                  <a:srgbClr val="1F2328"/>
+                </a:solidFill>
+                <a:latin typeface="Consolas"/>
+              </a:rPr>
+              <a:t>JDBC_DATABASE_URL</a:t>
+            </a:r>
+            <a:endParaRPr lang="pt-PT" sz="1600" b="1"/>
+          </a:p>
+        </p:txBody>
+      </p:sp>
+      <p:sp>
+        <p:nvSpPr>
+          <p:cNvPr id="4" name="Slide Number Placeholder 3">
+            <a:extLst>
+              <a:ext uri="{FF2B5EF4-FFF2-40B4-BE49-F238E27FC236}">
+                <a16:creationId xmlns:a16="http://schemas.microsoft.com/office/drawing/2014/main" id="{93CB4DB9-4362-8B89-62CE-443C18313FE0}"/>
+              </a:ext>
+            </a:extLst>
+          </p:cNvPr>
+          <p:cNvSpPr>
+            <a:spLocks noGrp="1"/>
+          </p:cNvSpPr>
+          <p:nvPr>
+            <p:ph type="sldNum" sz="quarter" idx="12"/>
+          </p:nvPr>
+        </p:nvSpPr>
+        <p:spPr/>
+        <p:txBody>
+          <a:bodyPr/>
+          <a:lstStyle/>
+          <a:p>
+            <a:fld id="{70C12960-6E85-460F-B6E3-5B82CB31AF3D}" type="slidenum">
+              <a:rPr lang="en-US" smtClean="0"/>
+              <a:t>13</a:t>
+            </a:fld>
+            <a:endParaRPr lang="en-US"/>
+          </a:p>
+        </p:txBody>
+      </p:sp>
+    </p:spTree>
+    <p:extLst>
+      <p:ext uri="{BB962C8B-B14F-4D97-AF65-F5344CB8AC3E}">
+        <p14:creationId xmlns:p14="http://schemas.microsoft.com/office/powerpoint/2010/main" val="867551938"/>
+      </p:ext>
+    </p:extLst>
+  </p:cSld>
+  <p:clrMapOvr>
+    <a:masterClrMapping/>
+  </p:clrMapOvr>
+</p:sld>
+</file>
+
+<file path=ppt/slides/slide14.xml><?xml version="1.0" encoding="utf-8"?>
+<p:sld xmlns:a="http://schemas.openxmlformats.org/drawingml/2006/main" xmlns:r="http://schemas.openxmlformats.org/officeDocument/2006/relationships" xmlns:p="http://schemas.openxmlformats.org/presentationml/2006/main">
+  <p:cSld>
+    <p:spTree>
+      <p:nvGrpSpPr>
+        <p:cNvPr id="1" name=""/>
+        <p:cNvGrpSpPr/>
+        <p:nvPr/>
+      </p:nvGrpSpPr>
+      <p:grpSpPr>
+        <a:xfrm>
+          <a:off x="0" y="0"/>
+          <a:ext cx="0" cy="0"/>
+          <a:chOff x="0" y="0"/>
+          <a:chExt cx="0" cy="0"/>
+        </a:xfrm>
+      </p:grpSpPr>
+      <p:sp>
+        <p:nvSpPr>
+          <p:cNvPr id="2" name="Title 1">
+            <a:extLst>
+              <a:ext uri="{FF2B5EF4-FFF2-40B4-BE49-F238E27FC236}">
+                <a16:creationId xmlns:a16="http://schemas.microsoft.com/office/drawing/2014/main" id="{FD3645B4-F501-F9A6-B4E3-BC2172AD6AA5}"/>
+              </a:ext>
+            </a:extLst>
+          </p:cNvPr>
+          <p:cNvSpPr>
+            <a:spLocks noGrp="1"/>
+          </p:cNvSpPr>
+          <p:nvPr>
+            <p:ph type="title"/>
+          </p:nvPr>
+        </p:nvSpPr>
+        <p:spPr/>
+        <p:txBody>
+          <a:bodyPr/>
+          <a:lstStyle/>
+          <a:p>
+            <a:r>
+              <a:rPr lang="pt-PT"/>
+              <a:t>Demo</a:t>
+            </a:r>
+          </a:p>
+        </p:txBody>
+      </p:sp>
+      <p:sp>
+        <p:nvSpPr>
+          <p:cNvPr id="3" name="Content Placeholder 2">
+            <a:extLst>
+              <a:ext uri="{FF2B5EF4-FFF2-40B4-BE49-F238E27FC236}">
+                <a16:creationId xmlns:a16="http://schemas.microsoft.com/office/drawing/2014/main" id="{ABC5CC97-9BA6-BD85-9BE8-2D14C455A80E}"/>
+              </a:ext>
+            </a:extLst>
+          </p:cNvPr>
+          <p:cNvSpPr>
+            <a:spLocks noGrp="1"/>
+          </p:cNvSpPr>
+          <p:nvPr>
+            <p:ph idx="1"/>
+          </p:nvPr>
+        </p:nvSpPr>
+        <p:spPr>
+          <a:xfrm>
+            <a:off x="640080" y="2113377"/>
+            <a:ext cx="10890928" cy="4606350"/>
+          </a:xfrm>
+        </p:spPr>
+        <p:txBody>
+          <a:bodyPr vert="horz" lIns="91440" tIns="45720" rIns="91440" bIns="45720" rtlCol="0" anchor="t">
+            <a:normAutofit fontScale="92500" lnSpcReduction="20000"/>
+          </a:bodyPr>
+          <a:lstStyle/>
+          <a:p>
+            <a:pPr marL="457200" indent="-457200">
+              <a:buAutoNum type="arabicPeriod"/>
+            </a:pPr>
+            <a:r>
+              <a:rPr lang="pt-PT"/>
+              <a:t>Criar a instância da BD no Render</a:t>
+            </a:r>
+          </a:p>
+          <a:p>
+            <a:pPr marL="457200" indent="-457200">
+              <a:buAutoNum type="arabicPeriod"/>
+            </a:pPr>
+            <a:r>
+              <a:rPr lang="pt-PT"/>
+              <a:t>Criar o jar da aplicação, que passa a incluir o manifest, com </a:t>
+            </a:r>
+            <a:r>
+              <a:rPr lang="pt-PT">
+                <a:latin typeface="Grandview Display"/>
+              </a:rPr>
+              <a:t>"</a:t>
+            </a:r>
+            <a:r>
+              <a:rPr lang="pt-PT">
+                <a:latin typeface="Consolas"/>
+              </a:rPr>
+              <a:t>gradlew build"</a:t>
+            </a:r>
+          </a:p>
+          <a:p>
+            <a:pPr marL="457200" indent="-457200">
+              <a:buAutoNum type="arabicPeriod"/>
+            </a:pPr>
+            <a:r>
+              <a:rPr lang="pt-PT"/>
+              <a:t>Criar o container Docker, que inclui o jar, com "</a:t>
+            </a:r>
+            <a:r>
+              <a:rPr lang="pt-PT">
+                <a:latin typeface="Consolas"/>
+              </a:rPr>
+              <a:t>docker build</a:t>
+            </a:r>
+            <a:r>
+              <a:rPr lang="pt-PT"/>
+              <a:t> (…)"</a:t>
+            </a:r>
+            <a:endParaRPr lang="pt-PT" dirty="0"/>
+          </a:p>
+          <a:p>
+            <a:pPr marL="457200" indent="-457200">
+              <a:buAutoNum type="arabicPeriod"/>
+            </a:pPr>
+            <a:r>
+              <a:rPr lang="pt-PT"/>
+              <a:t>Publicar o container Docker para o DockerHub, com  "</a:t>
+            </a:r>
+            <a:r>
+              <a:rPr lang="pt-PT">
+                <a:latin typeface="Consolas"/>
+              </a:rPr>
+              <a:t>docker push</a:t>
+            </a:r>
+            <a:r>
+              <a:rPr lang="pt-PT"/>
+              <a:t> (...)"</a:t>
+            </a:r>
+            <a:endParaRPr lang="pt-PT" dirty="0"/>
+          </a:p>
+          <a:p>
+            <a:pPr marL="457200" indent="-457200">
+              <a:buAutoNum type="arabicPeriod"/>
+            </a:pPr>
+            <a:r>
+              <a:rPr lang="pt-PT"/>
+              <a:t>Criar o web service no Render, que irá ligar-se ao container no DockerHub</a:t>
+            </a:r>
+            <a:endParaRPr lang="pt-PT" dirty="0"/>
+          </a:p>
+          <a:p>
+            <a:pPr marL="0" indent="0">
+              <a:buNone/>
+            </a:pPr>
+            <a:endParaRPr lang="pt-PT" dirty="0"/>
+          </a:p>
+          <a:p>
+            <a:pPr marL="0" indent="0">
+              <a:buNone/>
+            </a:pPr>
+            <a:r>
+              <a:rPr lang="pt-PT"/>
+              <a:t>Para testar as ligações ao servidor, no portátil:</a:t>
+            </a:r>
+            <a:endParaRPr lang="pt-PT" dirty="0"/>
+          </a:p>
+          <a:p>
+            <a:pPr marL="457200" indent="-457200">
+              <a:buAutoNum type="arabicPeriod"/>
+            </a:pPr>
+            <a:r>
+              <a:rPr lang="pt-PT" u="sng"/>
+              <a:t>Teste Local:</a:t>
+            </a:r>
+            <a:r>
+              <a:rPr lang="pt-PT"/>
+              <a:t> correr localmente o container que foi publicado no DockerHub com o comando "</a:t>
+            </a:r>
+            <a:r>
+              <a:rPr lang="pt-PT">
+                <a:latin typeface="Consolas"/>
+              </a:rPr>
+              <a:t>docker run</a:t>
+            </a:r>
+            <a:r>
+              <a:rPr lang="pt-PT"/>
+              <a:t> (…)". No browser abrir a página em </a:t>
+            </a:r>
+            <a:r>
+              <a:rPr lang="pt-PT" b="1"/>
+              <a:t>localhost:9000</a:t>
+            </a:r>
+            <a:r>
+              <a:rPr lang="pt-PT"/>
+              <a:t> e ver que a aplicação está a </a:t>
+            </a:r>
+            <a:r>
+              <a:rPr lang="pt-PT" dirty="0"/>
+              <a:t>correr</a:t>
+            </a:r>
+          </a:p>
+          <a:p>
+            <a:pPr marL="457200" indent="-457200">
+              <a:buAutoNum type="arabicPeriod"/>
+            </a:pPr>
+            <a:r>
+              <a:rPr lang="pt-PT" u="sng"/>
+              <a:t>Teste Remoto:</a:t>
+            </a:r>
+            <a:r>
+              <a:rPr lang="pt-PT"/>
+              <a:t> abrir a página do serviço que está a correr no Render. No browser, abrir a página </a:t>
+            </a:r>
+            <a:r>
+              <a:rPr lang="pt-PT" b="1"/>
+              <a:t>https://&lt;nome do serviço&gt;.onrender.com</a:t>
+            </a:r>
+            <a:r>
+              <a:rPr lang="pt-PT"/>
+              <a:t> e ver que a aplicação está a correr</a:t>
+            </a:r>
+            <a:endParaRPr lang="pt-PT" dirty="0"/>
+          </a:p>
+          <a:p>
+            <a:pPr marL="457200" indent="-457200">
+              <a:buAutoNum type="arabicPeriod"/>
+            </a:pPr>
+            <a:endParaRPr lang="pt-PT" dirty="0"/>
+          </a:p>
+        </p:txBody>
+      </p:sp>
+      <p:sp>
+        <p:nvSpPr>
+          <p:cNvPr id="4" name="Slide Number Placeholder 3">
+            <a:extLst>
+              <a:ext uri="{FF2B5EF4-FFF2-40B4-BE49-F238E27FC236}">
+                <a16:creationId xmlns:a16="http://schemas.microsoft.com/office/drawing/2014/main" id="{3734783D-C3A4-473D-88B0-E9C1DD79CC9C}"/>
+              </a:ext>
+            </a:extLst>
+          </p:cNvPr>
+          <p:cNvSpPr>
+            <a:spLocks noGrp="1"/>
+          </p:cNvSpPr>
+          <p:nvPr>
+            <p:ph type="sldNum" sz="quarter" idx="12"/>
+          </p:nvPr>
+        </p:nvSpPr>
+        <p:spPr/>
+        <p:txBody>
+          <a:bodyPr/>
+          <a:lstStyle/>
+          <a:p>
+            <a:fld id="{70C12960-6E85-460F-B6E3-5B82CB31AF3D}" type="slidenum">
+              <a:rPr lang="en-US" smtClean="0"/>
+              <a:t>14</a:t>
+            </a:fld>
+            <a:endParaRPr lang="en-US"/>
+          </a:p>
+        </p:txBody>
+      </p:sp>
+    </p:spTree>
+    <p:extLst>
+      <p:ext uri="{BB962C8B-B14F-4D97-AF65-F5344CB8AC3E}">
+        <p14:creationId xmlns:p14="http://schemas.microsoft.com/office/powerpoint/2010/main" val="165708681"/>
+      </p:ext>
+    </p:extLst>
+  </p:cSld>
+  <p:clrMapOvr>
+    <a:masterClrMapping/>
+  </p:clrMapOvr>
+</p:sld>
+</file>
+
+<file path=ppt/slides/slide15.xml><?xml version="1.0" encoding="utf-8"?>
+<p:sld xmlns:a="http://schemas.openxmlformats.org/drawingml/2006/main" xmlns:r="http://schemas.openxmlformats.org/officeDocument/2006/relationships" xmlns:p="http://schemas.openxmlformats.org/presentationml/2006/main">
+  <p:cSld>
     <p:bg>
       <p:bgPr>
         <a:solidFill>
@@ -16129,7 +16814,7 @@
                   <a:spcPts val="600"/>
                 </a:spcAft>
               </a:pPr>
-              <a:t>13</a:t>
+              <a:t>15</a:t>
             </a:fld>
             <a:endParaRPr lang="en-US"/>
           </a:p>
@@ -16785,14 +17470,14 @@
             <p:ph idx="1"/>
             <p:extLst>
               <p:ext uri="{D42A27DB-BD31-4B8C-83A1-F6EECF244321}">
-                <p14:modId xmlns:p14="http://schemas.microsoft.com/office/powerpoint/2010/main" val="1695077711"/>
+                <p14:modId xmlns:p14="http://schemas.microsoft.com/office/powerpoint/2010/main" val="2402815836"/>
               </p:ext>
             </p:extLst>
           </p:nvPr>
         </p:nvGraphicFramePr>
         <p:xfrm>
-          <a:off x="639763" y="2633663"/>
-          <a:ext cx="10891837" cy="3565525"/>
+          <a:off x="639763" y="2089378"/>
+          <a:ext cx="10891837" cy="4448476"/>
         </p:xfrm>
         <a:graphic>
           <a:graphicData uri="http://schemas.openxmlformats.org/drawingml/2006/diagram">

</xml_diff>

<commit_message>
update about session storage
</commit_message>
<xml_diff>
--- a/Material de Apoio/07 - Fase 4.pptx
+++ b/Material de Apoio/07 - Fase 4.pptx
@@ -4131,19 +4131,7 @@
             <a:rPr lang="pt-PT" dirty="0">
               <a:latin typeface="Grandview Display"/>
             </a:rPr>
-            <a:t> pode ser guardado no </a:t>
-          </a:r>
-          <a:r>
-            <a:rPr lang="pt-PT" dirty="0" err="1">
-              <a:latin typeface="Grandview Display"/>
-            </a:rPr>
-            <a:t>session</a:t>
-          </a:r>
-          <a:r>
-            <a:rPr lang="pt-PT" dirty="0">
-              <a:latin typeface="Grandview Display"/>
-            </a:rPr>
-            <a:t> storage, para não se perder, em caso de</a:t>
+            <a:t> pode ser guardado no session storage (sessionStorage.setItem), para não se perder, em caso de</a:t>
           </a:r>
           <a:r>
             <a:rPr lang="pt-PT" sz="2400" dirty="0">
@@ -4308,26 +4296,26 @@
   <dgm:cxnLst>
     <dgm:cxn modelId="{066E3F0E-D6FA-462B-A82D-A6E0668EBABF}" srcId="{89E0F444-4096-482F-A5CB-848E300B1AD2}" destId="{D4F5A3DD-2C45-4C24-961F-4EFE1ED5D580}" srcOrd="1" destOrd="0" parTransId="{18228035-6BDC-4FB3-BCA6-7F9DD583A0D6}" sibTransId="{F4D0D3F2-5199-466B-AF74-D4381F61609D}"/>
     <dgm:cxn modelId="{A5867625-355D-40A4-8F6E-FCE6CE97BA28}" type="presOf" srcId="{89E0F444-4096-482F-A5CB-848E300B1AD2}" destId="{0EA0E371-CBB2-434A-A2E4-60A0FFC44DFF}" srcOrd="0" destOrd="0" presId="urn:microsoft.com/office/officeart/2005/8/layout/list1"/>
-    <dgm:cxn modelId="{F013CD2C-ABB2-4EDB-B71B-16B6674664F6}" type="presOf" srcId="{A86F5801-158B-468D-876D-D0E8B78921C9}" destId="{3696E0AE-3388-4BED-BDBE-7698BEBC8501}" srcOrd="1" destOrd="0" presId="urn:microsoft.com/office/officeart/2005/8/layout/list1"/>
+    <dgm:cxn modelId="{17B4B228-8BAF-49C5-8B4F-C6D677FF2A94}" type="presOf" srcId="{D4F5A3DD-2C45-4C24-961F-4EFE1ED5D580}" destId="{9DF227BF-23C0-4470-B68A-3552ABA89F07}" srcOrd="0" destOrd="0" presId="urn:microsoft.com/office/officeart/2005/8/layout/list1"/>
     <dgm:cxn modelId="{61FEF138-963F-4437-AAA5-8F78C9C4658F}" srcId="{0DCF843A-5B8D-4438-967C-93B3417BA108}" destId="{6024448C-13E3-48BE-904F-999E9C9C04C3}" srcOrd="0" destOrd="0" parTransId="{F4027F60-A6DA-4717-B46D-A74CF83B38CA}" sibTransId="{3672C724-C6BC-4CD9-AA94-F0EF552139DB}"/>
+    <dgm:cxn modelId="{A5176364-0BF8-4ED0-9B54-095A0D81FA35}" type="presOf" srcId="{D4F5A3DD-2C45-4C24-961F-4EFE1ED5D580}" destId="{AB40ED03-F82F-405E-B301-91D51A794ED5}" srcOrd="1" destOrd="0" presId="urn:microsoft.com/office/officeart/2005/8/layout/list1"/>
     <dgm:cxn modelId="{17603E48-EB3C-49C5-8E8C-D8234858817B}" srcId="{0DCF843A-5B8D-4438-967C-93B3417BA108}" destId="{49D8B59D-32DA-4A84-B53B-60AF224D9717}" srcOrd="1" destOrd="0" parTransId="{791D63EC-571D-4F8F-A9E8-C31B45644E28}" sibTransId="{FC721068-926B-4A10-A9AB-3245C6BF83ED}"/>
-    <dgm:cxn modelId="{C9B0CA82-1595-45DD-BFAC-E90DE3578A16}" type="presOf" srcId="{D4F5A3DD-2C45-4C24-961F-4EFE1ED5D580}" destId="{9DF227BF-23C0-4470-B68A-3552ABA89F07}" srcOrd="0" destOrd="0" presId="urn:microsoft.com/office/officeart/2005/8/layout/list1"/>
+    <dgm:cxn modelId="{22C52285-0AE4-480C-B013-B8506261289F}" type="presOf" srcId="{A86F5801-158B-468D-876D-D0E8B78921C9}" destId="{CB43B7E4-2F67-4340-83A2-06E2FE8C0EB7}" srcOrd="0" destOrd="0" presId="urn:microsoft.com/office/officeart/2005/8/layout/list1"/>
     <dgm:cxn modelId="{1D47AD8B-E033-4BC3-AB2F-62DA5A07806D}" type="presOf" srcId="{49D8B59D-32DA-4A84-B53B-60AF224D9717}" destId="{F1183D25-0EDC-4437-88C4-6E1708937DAB}" srcOrd="0" destOrd="2" presId="urn:microsoft.com/office/officeart/2005/8/layout/list1"/>
+    <dgm:cxn modelId="{C6F45CAB-CE5F-4267-8487-4D4252A6278A}" type="presOf" srcId="{A86F5801-158B-468D-876D-D0E8B78921C9}" destId="{3696E0AE-3388-4BED-BDBE-7698BEBC8501}" srcOrd="1" destOrd="0" presId="urn:microsoft.com/office/officeart/2005/8/layout/list1"/>
     <dgm:cxn modelId="{0214DBB0-EA5E-48B1-B5A3-1984839219A7}" type="presOf" srcId="{0DCF843A-5B8D-4438-967C-93B3417BA108}" destId="{F1183D25-0EDC-4437-88C4-6E1708937DAB}" srcOrd="0" destOrd="0" presId="urn:microsoft.com/office/officeart/2005/8/layout/list1"/>
     <dgm:cxn modelId="{403999BE-4667-4B64-994E-7DE8FB5BE5B2}" srcId="{89E0F444-4096-482F-A5CB-848E300B1AD2}" destId="{A86F5801-158B-468D-876D-D0E8B78921C9}" srcOrd="0" destOrd="0" parTransId="{0F1F7E59-24D7-40F3-9361-1DD88CE09698}" sibTransId="{AE2BEC37-D894-48B6-9F87-017611157D7B}"/>
     <dgm:cxn modelId="{030A2CD0-3A1D-4806-B2B9-E882E3A6B0C6}" type="presOf" srcId="{6024448C-13E3-48BE-904F-999E9C9C04C3}" destId="{F1183D25-0EDC-4437-88C4-6E1708937DAB}" srcOrd="0" destOrd="1" presId="urn:microsoft.com/office/officeart/2005/8/layout/list1"/>
     <dgm:cxn modelId="{A14A1DD5-8C1C-4ED1-8DC2-0C7ADA8E3ECF}" srcId="{D4F5A3DD-2C45-4C24-961F-4EFE1ED5D580}" destId="{0DCF843A-5B8D-4438-967C-93B3417BA108}" srcOrd="0" destOrd="0" parTransId="{28BC4827-AAD3-4F73-B830-E22C03C15C05}" sibTransId="{A1F10322-0C72-4903-972F-C0D5FC4299A2}"/>
-    <dgm:cxn modelId="{9249DCDD-3F09-457D-9025-63952FB98C47}" type="presOf" srcId="{D4F5A3DD-2C45-4C24-961F-4EFE1ED5D580}" destId="{AB40ED03-F82F-405E-B301-91D51A794ED5}" srcOrd="1" destOrd="0" presId="urn:microsoft.com/office/officeart/2005/8/layout/list1"/>
-    <dgm:cxn modelId="{F277E0E1-17A2-4800-A6F2-9E093323ED28}" type="presOf" srcId="{A86F5801-158B-468D-876D-D0E8B78921C9}" destId="{CB43B7E4-2F67-4340-83A2-06E2FE8C0EB7}" srcOrd="0" destOrd="0" presId="urn:microsoft.com/office/officeart/2005/8/layout/list1"/>
     <dgm:cxn modelId="{B0908CB4-F7B6-4882-8195-B4E9B388051D}" type="presParOf" srcId="{0EA0E371-CBB2-434A-A2E4-60A0FFC44DFF}" destId="{EE8DC717-2EAB-44D0-BC82-4694B6619055}" srcOrd="0" destOrd="0" presId="urn:microsoft.com/office/officeart/2005/8/layout/list1"/>
-    <dgm:cxn modelId="{DDD9426A-2046-4388-9669-0D7943298ACF}" type="presParOf" srcId="{EE8DC717-2EAB-44D0-BC82-4694B6619055}" destId="{CB43B7E4-2F67-4340-83A2-06E2FE8C0EB7}" srcOrd="0" destOrd="0" presId="urn:microsoft.com/office/officeart/2005/8/layout/list1"/>
-    <dgm:cxn modelId="{9E55D21E-8E71-47BC-B6A8-2869FE7B1CA1}" type="presParOf" srcId="{EE8DC717-2EAB-44D0-BC82-4694B6619055}" destId="{3696E0AE-3388-4BED-BDBE-7698BEBC8501}" srcOrd="1" destOrd="0" presId="urn:microsoft.com/office/officeart/2005/8/layout/list1"/>
+    <dgm:cxn modelId="{A5BCC1E6-0B25-4FEA-8D16-0EC086031C2F}" type="presParOf" srcId="{EE8DC717-2EAB-44D0-BC82-4694B6619055}" destId="{CB43B7E4-2F67-4340-83A2-06E2FE8C0EB7}" srcOrd="0" destOrd="0" presId="urn:microsoft.com/office/officeart/2005/8/layout/list1"/>
+    <dgm:cxn modelId="{C83C1DA8-F1C2-44EF-830A-993257E7497E}" type="presParOf" srcId="{EE8DC717-2EAB-44D0-BC82-4694B6619055}" destId="{3696E0AE-3388-4BED-BDBE-7698BEBC8501}" srcOrd="1" destOrd="0" presId="urn:microsoft.com/office/officeart/2005/8/layout/list1"/>
     <dgm:cxn modelId="{9BD7AA26-4DD5-4326-A769-B28635B5DBA7}" type="presParOf" srcId="{0EA0E371-CBB2-434A-A2E4-60A0FFC44DFF}" destId="{8627648E-6E91-4C31-A716-DA51A6E26DBA}" srcOrd="1" destOrd="0" presId="urn:microsoft.com/office/officeart/2005/8/layout/list1"/>
     <dgm:cxn modelId="{5094ECD2-D876-4C37-8CB2-67181CA9A903}" type="presParOf" srcId="{0EA0E371-CBB2-434A-A2E4-60A0FFC44DFF}" destId="{FA783A33-3E7A-4009-9AA2-AC2EC7147DD4}" srcOrd="2" destOrd="0" presId="urn:microsoft.com/office/officeart/2005/8/layout/list1"/>
     <dgm:cxn modelId="{35D5425D-CDF1-4DB4-A0EF-95CDE5D4ECF3}" type="presParOf" srcId="{0EA0E371-CBB2-434A-A2E4-60A0FFC44DFF}" destId="{01815B96-DD53-4894-B4DB-2666646C4876}" srcOrd="3" destOrd="0" presId="urn:microsoft.com/office/officeart/2005/8/layout/list1"/>
     <dgm:cxn modelId="{ECC120F0-6EE8-4527-B59F-792F402ADBB6}" type="presParOf" srcId="{0EA0E371-CBB2-434A-A2E4-60A0FFC44DFF}" destId="{54069224-F0BC-4E58-A65D-382F2966D6F0}" srcOrd="4" destOrd="0" presId="urn:microsoft.com/office/officeart/2005/8/layout/list1"/>
-    <dgm:cxn modelId="{2A5311F0-0D46-49CA-848F-7C9AD42BB0AB}" type="presParOf" srcId="{54069224-F0BC-4E58-A65D-382F2966D6F0}" destId="{9DF227BF-23C0-4470-B68A-3552ABA89F07}" srcOrd="0" destOrd="0" presId="urn:microsoft.com/office/officeart/2005/8/layout/list1"/>
-    <dgm:cxn modelId="{A3160887-69B4-4A86-AD5E-A8D2F55F7CE6}" type="presParOf" srcId="{54069224-F0BC-4E58-A65D-382F2966D6F0}" destId="{AB40ED03-F82F-405E-B301-91D51A794ED5}" srcOrd="1" destOrd="0" presId="urn:microsoft.com/office/officeart/2005/8/layout/list1"/>
+    <dgm:cxn modelId="{75807548-D12E-425D-913F-FD634B999945}" type="presParOf" srcId="{54069224-F0BC-4E58-A65D-382F2966D6F0}" destId="{9DF227BF-23C0-4470-B68A-3552ABA89F07}" srcOrd="0" destOrd="0" presId="urn:microsoft.com/office/officeart/2005/8/layout/list1"/>
+    <dgm:cxn modelId="{3594BEEB-39A6-49D7-8A50-2EEC38C40ABE}" type="presParOf" srcId="{54069224-F0BC-4E58-A65D-382F2966D6F0}" destId="{AB40ED03-F82F-405E-B301-91D51A794ED5}" srcOrd="1" destOrd="0" presId="urn:microsoft.com/office/officeart/2005/8/layout/list1"/>
     <dgm:cxn modelId="{DD18D366-51E2-466D-86BC-471970065A2C}" type="presParOf" srcId="{0EA0E371-CBB2-434A-A2E4-60A0FFC44DFF}" destId="{65A4272D-D18B-4E4B-B8FC-91346E275CA5}" srcOrd="5" destOrd="0" presId="urn:microsoft.com/office/officeart/2005/8/layout/list1"/>
     <dgm:cxn modelId="{6EA98F52-C0D7-4403-8BCF-747B825E2AA3}" type="presParOf" srcId="{0EA0E371-CBB2-434A-A2E4-60A0FFC44DFF}" destId="{F1183D25-0EDC-4437-88C4-6E1708937DAB}" srcOrd="6" destOrd="0" presId="urn:microsoft.com/office/officeart/2005/8/layout/list1"/>
   </dgm:cxnLst>
@@ -5650,19 +5638,7 @@
             <a:rPr lang="pt-PT" kern="1200" dirty="0">
               <a:latin typeface="Grandview Display"/>
             </a:rPr>
-            <a:t> pode ser guardado no </a:t>
-          </a:r>
-          <a:r>
-            <a:rPr lang="pt-PT" kern="1200" dirty="0" err="1">
-              <a:latin typeface="Grandview Display"/>
-            </a:rPr>
-            <a:t>session</a:t>
-          </a:r>
-          <a:r>
-            <a:rPr lang="pt-PT" kern="1200" dirty="0">
-              <a:latin typeface="Grandview Display"/>
-            </a:rPr>
-            <a:t> storage, para não se perder, em caso de</a:t>
+            <a:t> pode ser guardado no session storage (sessionStorage.setItem), para não se perder, em caso de</a:t>
           </a:r>
           <a:r>
             <a:rPr lang="pt-PT" sz="2400" kern="1200" dirty="0">

</xml_diff>